<commit_message>
revisión mapa conceptual 10-05
</commit_message>
<xml_diff>
--- a/fuentes/contenidos/grado10/guion05/CN_10_05_CO.pptx
+++ b/fuentes/contenidos/grado10/guion05/CN_10_05_CO.pptx
@@ -208,7 +208,7 @@
           <a:p>
             <a:fld id="{3136A635-BC74-4205-AABA-385FD08CF07B}" type="datetimeFigureOut">
               <a:rPr lang="es-ES" smtClean="0"/>
-              <a:t>09/05/2016</a:t>
+              <a:t>31/05/2016</a:t>
             </a:fld>
             <a:endParaRPr lang="es-ES"/>
           </a:p>
@@ -741,7 +741,7 @@
           <a:p>
             <a:fld id="{3E96FF5D-3ADE-48A8-92B3-53E56281CB3B}" type="datetimeFigureOut">
               <a:rPr lang="es-ES" smtClean="0"/>
-              <a:t>09/05/2016</a:t>
+              <a:t>31/05/2016</a:t>
             </a:fld>
             <a:endParaRPr lang="es-ES"/>
           </a:p>
@@ -911,7 +911,7 @@
           <a:p>
             <a:fld id="{3E96FF5D-3ADE-48A8-92B3-53E56281CB3B}" type="datetimeFigureOut">
               <a:rPr lang="es-ES" smtClean="0"/>
-              <a:t>09/05/2016</a:t>
+              <a:t>31/05/2016</a:t>
             </a:fld>
             <a:endParaRPr lang="es-ES"/>
           </a:p>
@@ -1091,7 +1091,7 @@
           <a:p>
             <a:fld id="{3E96FF5D-3ADE-48A8-92B3-53E56281CB3B}" type="datetimeFigureOut">
               <a:rPr lang="es-ES" smtClean="0"/>
-              <a:t>09/05/2016</a:t>
+              <a:t>31/05/2016</a:t>
             </a:fld>
             <a:endParaRPr lang="es-ES"/>
           </a:p>
@@ -1261,7 +1261,7 @@
           <a:p>
             <a:fld id="{3E96FF5D-3ADE-48A8-92B3-53E56281CB3B}" type="datetimeFigureOut">
               <a:rPr lang="es-ES" smtClean="0"/>
-              <a:t>09/05/2016</a:t>
+              <a:t>31/05/2016</a:t>
             </a:fld>
             <a:endParaRPr lang="es-ES"/>
           </a:p>
@@ -1507,7 +1507,7 @@
           <a:p>
             <a:fld id="{3E96FF5D-3ADE-48A8-92B3-53E56281CB3B}" type="datetimeFigureOut">
               <a:rPr lang="es-ES" smtClean="0"/>
-              <a:t>09/05/2016</a:t>
+              <a:t>31/05/2016</a:t>
             </a:fld>
             <a:endParaRPr lang="es-ES"/>
           </a:p>
@@ -1795,7 +1795,7 @@
           <a:p>
             <a:fld id="{3E96FF5D-3ADE-48A8-92B3-53E56281CB3B}" type="datetimeFigureOut">
               <a:rPr lang="es-ES" smtClean="0"/>
-              <a:t>09/05/2016</a:t>
+              <a:t>31/05/2016</a:t>
             </a:fld>
             <a:endParaRPr lang="es-ES"/>
           </a:p>
@@ -2217,7 +2217,7 @@
           <a:p>
             <a:fld id="{3E96FF5D-3ADE-48A8-92B3-53E56281CB3B}" type="datetimeFigureOut">
               <a:rPr lang="es-ES" smtClean="0"/>
-              <a:t>09/05/2016</a:t>
+              <a:t>31/05/2016</a:t>
             </a:fld>
             <a:endParaRPr lang="es-ES"/>
           </a:p>
@@ -2335,7 +2335,7 @@
           <a:p>
             <a:fld id="{3E96FF5D-3ADE-48A8-92B3-53E56281CB3B}" type="datetimeFigureOut">
               <a:rPr lang="es-ES" smtClean="0"/>
-              <a:t>09/05/2016</a:t>
+              <a:t>31/05/2016</a:t>
             </a:fld>
             <a:endParaRPr lang="es-ES"/>
           </a:p>
@@ -2430,7 +2430,7 @@
           <a:p>
             <a:fld id="{3E96FF5D-3ADE-48A8-92B3-53E56281CB3B}" type="datetimeFigureOut">
               <a:rPr lang="es-ES" smtClean="0"/>
-              <a:t>09/05/2016</a:t>
+              <a:t>31/05/2016</a:t>
             </a:fld>
             <a:endParaRPr lang="es-ES"/>
           </a:p>
@@ -2707,7 +2707,7 @@
           <a:p>
             <a:fld id="{3E96FF5D-3ADE-48A8-92B3-53E56281CB3B}" type="datetimeFigureOut">
               <a:rPr lang="es-ES" smtClean="0"/>
-              <a:t>09/05/2016</a:t>
+              <a:t>31/05/2016</a:t>
             </a:fld>
             <a:endParaRPr lang="es-ES"/>
           </a:p>
@@ -2960,7 +2960,7 @@
           <a:p>
             <a:fld id="{3E96FF5D-3ADE-48A8-92B3-53E56281CB3B}" type="datetimeFigureOut">
               <a:rPr lang="es-ES" smtClean="0"/>
-              <a:t>09/05/2016</a:t>
+              <a:t>31/05/2016</a:t>
             </a:fld>
             <a:endParaRPr lang="es-ES"/>
           </a:p>
@@ -3173,7 +3173,7 @@
           <a:p>
             <a:fld id="{3E96FF5D-3ADE-48A8-92B3-53E56281CB3B}" type="datetimeFigureOut">
               <a:rPr lang="es-ES" smtClean="0"/>
-              <a:t>09/05/2016</a:t>
+              <a:t>31/05/2016</a:t>
             </a:fld>
             <a:endParaRPr lang="es-ES"/>
           </a:p>
@@ -3804,15 +3804,7 @@
                   <a:schemeClr val="bg1"/>
                 </a:solidFill>
               </a:rPr>
-              <a:t>apacidad </a:t>
-            </a:r>
-            <a:r>
-              <a:rPr lang="es-ES" sz="1000" dirty="0" smtClean="0">
-                <a:solidFill>
-                  <a:schemeClr val="bg1"/>
-                </a:solidFill>
-              </a:rPr>
-              <a:t>de un cuerpo para transformarse o transformar a otros</a:t>
+              <a:t>apacidad de un cuerpo para transformarse o transformar a otros</a:t>
             </a:r>
           </a:p>
         </p:txBody>
@@ -3864,15 +3856,7 @@
                   <a:schemeClr val="bg1"/>
                 </a:solidFill>
               </a:rPr>
-              <a:t>rincipio </a:t>
-            </a:r>
-            <a:r>
-              <a:rPr lang="es-ES" sz="1000" dirty="0" smtClean="0">
-                <a:solidFill>
-                  <a:schemeClr val="bg1"/>
-                </a:solidFill>
-              </a:rPr>
-              <a:t>de conservación</a:t>
+              <a:t>rincipio de conservación</a:t>
             </a:r>
           </a:p>
         </p:txBody>
@@ -3929,11 +3913,6 @@
               </a:rPr>
               <a:t>érmica</a:t>
             </a:r>
-            <a:endParaRPr lang="es-ES" sz="1000" dirty="0" smtClean="0">
-              <a:solidFill>
-                <a:schemeClr val="bg1"/>
-              </a:solidFill>
-            </a:endParaRPr>
           </a:p>
           <a:p>
             <a:pPr marL="108000" indent="-171450" algn="just">
@@ -3948,11 +3927,6 @@
               </a:rPr>
               <a:t>eléctrica</a:t>
             </a:r>
-            <a:endParaRPr lang="es-ES" sz="1000" dirty="0" smtClean="0">
-              <a:solidFill>
-                <a:schemeClr val="bg1"/>
-              </a:solidFill>
-            </a:endParaRPr>
           </a:p>
           <a:p>
             <a:pPr marL="108000" indent="-171450" algn="just">
@@ -3975,11 +3949,6 @@
               </a:rPr>
               <a:t>lectromagnética</a:t>
             </a:r>
-            <a:endParaRPr lang="es-ES" sz="1000" dirty="0" smtClean="0">
-              <a:solidFill>
-                <a:schemeClr val="bg1"/>
-              </a:solidFill>
-            </a:endParaRPr>
           </a:p>
           <a:p>
             <a:pPr marL="108000" indent="-171450" algn="just">
@@ -4002,11 +3971,6 @@
               </a:rPr>
               <a:t>uímica</a:t>
             </a:r>
-            <a:endParaRPr lang="es-ES" sz="1000" dirty="0" smtClean="0">
-              <a:solidFill>
-                <a:schemeClr val="bg1"/>
-              </a:solidFill>
-            </a:endParaRPr>
           </a:p>
           <a:p>
             <a:pPr marL="171450" indent="-171450" algn="just">
@@ -4029,11 +3993,6 @@
               </a:rPr>
               <a:t>uclear</a:t>
             </a:r>
-            <a:endParaRPr lang="es-ES" sz="1000" dirty="0" smtClean="0">
-              <a:solidFill>
-                <a:schemeClr val="bg1"/>
-              </a:solidFill>
-            </a:endParaRPr>
           </a:p>
         </p:txBody>
       </p:sp>
@@ -4086,11 +4045,6 @@
               </a:rPr>
               <a:t>uentes</a:t>
             </a:r>
-            <a:endParaRPr lang="es-ES" sz="1000" dirty="0" smtClean="0">
-              <a:solidFill>
-                <a:schemeClr val="bg1"/>
-              </a:solidFill>
-            </a:endParaRPr>
           </a:p>
           <a:p>
             <a:pPr algn="ctr"/>
@@ -4102,11 +4056,6 @@
               </a:rPr>
               <a:t>renovables</a:t>
             </a:r>
-            <a:endParaRPr lang="es-ES" sz="1000" dirty="0" smtClean="0">
-              <a:solidFill>
-                <a:schemeClr val="bg1"/>
-              </a:solidFill>
-            </a:endParaRPr>
           </a:p>
         </p:txBody>
       </p:sp>
@@ -4157,15 +4106,7 @@
                   <a:schemeClr val="bg1"/>
                 </a:solidFill>
               </a:rPr>
-              <a:t>uentes </a:t>
-            </a:r>
-            <a:r>
-              <a:rPr lang="es-ES" sz="1000" dirty="0" smtClean="0">
-                <a:solidFill>
-                  <a:schemeClr val="bg1"/>
-                </a:solidFill>
-              </a:rPr>
-              <a:t>No</a:t>
+              <a:t>uentes No</a:t>
             </a:r>
           </a:p>
           <a:p>
@@ -4186,11 +4127,6 @@
               </a:rPr>
               <a:t>enovables</a:t>
             </a:r>
-            <a:endParaRPr lang="es-ES" sz="1000" dirty="0" smtClean="0">
-              <a:solidFill>
-                <a:schemeClr val="bg1"/>
-              </a:solidFill>
-            </a:endParaRPr>
           </a:p>
         </p:txBody>
       </p:sp>
@@ -4233,7 +4169,15 @@
                   <a:schemeClr val="bg1"/>
                 </a:solidFill>
               </a:rPr>
-              <a:t>Energía necesaria  para desplazar un objeto aplicando fuerza</a:t>
+              <a:t>energía </a:t>
+            </a:r>
+            <a:r>
+              <a:rPr lang="es-ES" sz="1000" dirty="0" smtClean="0">
+                <a:solidFill>
+                  <a:schemeClr val="bg1"/>
+                </a:solidFill>
+              </a:rPr>
+              <a:t>necesaria  para desplazar un objeto aplicando fuerza</a:t>
             </a:r>
           </a:p>
         </p:txBody>
@@ -4272,12 +4216,28 @@
           <a:p>
             <a:pPr algn="ctr"/>
             <a:r>
+              <a:rPr lang="es-ES" sz="1000" dirty="0">
+                <a:solidFill>
+                  <a:schemeClr val="bg1"/>
+                </a:solidFill>
+              </a:rPr>
+              <a:t>c</a:t>
+            </a:r>
+            <a:r>
               <a:rPr lang="es-ES" sz="1000" dirty="0" smtClean="0">
                 <a:solidFill>
                   <a:schemeClr val="bg1"/>
                 </a:solidFill>
               </a:rPr>
-              <a:t>Cantidad de trabajo realizado en la unidad de tiempo</a:t>
+              <a:t>antidad </a:t>
+            </a:r>
+            <a:r>
+              <a:rPr lang="es-ES" sz="1000" dirty="0" smtClean="0">
+                <a:solidFill>
+                  <a:schemeClr val="bg1"/>
+                </a:solidFill>
+              </a:rPr>
+              <a:t>de trabajo realizado en la unidad de tiempo</a:t>
             </a:r>
           </a:p>
         </p:txBody>
@@ -4316,12 +4276,28 @@
           <a:p>
             <a:pPr algn="ctr"/>
             <a:r>
+              <a:rPr lang="es-ES" sz="1000" dirty="0">
+                <a:solidFill>
+                  <a:schemeClr val="bg1"/>
+                </a:solidFill>
+              </a:rPr>
+              <a:t>r</a:t>
+            </a:r>
+            <a:r>
+              <a:rPr lang="es-ES" sz="1000" smtClean="0">
+                <a:solidFill>
+                  <a:schemeClr val="bg1"/>
+                </a:solidFill>
+              </a:rPr>
+              <a:t>azón </a:t>
+            </a:r>
+            <a:r>
               <a:rPr lang="es-ES" sz="1000" dirty="0" smtClean="0">
                 <a:solidFill>
                   <a:schemeClr val="bg1"/>
                 </a:solidFill>
               </a:rPr>
-              <a:t>Razón entre trabajo útil y la energía suministrada a un sistema</a:t>
+              <a:t>entre trabajo útil y la energía suministrada a un sistema</a:t>
             </a:r>
           </a:p>
         </p:txBody>
@@ -4414,11 +4390,7 @@
             </a:r>
             <a:r>
               <a:rPr lang="es-ES" sz="900" dirty="0" smtClean="0"/>
-              <a:t>a </a:t>
-            </a:r>
-            <a:r>
-              <a:rPr lang="es-ES" sz="900" dirty="0" smtClean="0"/>
-              <a:t>energía no se crea ni se destruye, solo se transforma</a:t>
+              <a:t>a energía no se crea ni se destruye, solo se transforma</a:t>
             </a:r>
           </a:p>
         </p:txBody>
@@ -4456,16 +4428,26 @@
           <a:p>
             <a:pPr algn="ctr"/>
             <a:r>
+              <a:rPr lang="es-ES" sz="900" dirty="0"/>
+              <a:t>e</a:t>
+            </a:r>
+            <a:r>
               <a:rPr lang="es-ES" sz="900" dirty="0" smtClean="0"/>
-              <a:t>Energía</a:t>
-            </a:r>
+              <a:t>nergía</a:t>
+            </a:r>
+            <a:endParaRPr lang="es-ES" sz="900" dirty="0" smtClean="0"/>
           </a:p>
           <a:p>
             <a:pPr algn="ctr"/>
             <a:r>
+              <a:rPr lang="es-ES" sz="900" dirty="0"/>
+              <a:t>m</a:t>
+            </a:r>
+            <a:r>
               <a:rPr lang="es-ES" sz="900" dirty="0" smtClean="0"/>
-              <a:t>Mecánica</a:t>
-            </a:r>
+              <a:t>ecánica</a:t>
+            </a:r>
+            <a:endParaRPr lang="es-ES" sz="900" dirty="0" smtClean="0"/>
           </a:p>
         </p:txBody>
       </p:sp>
@@ -4508,7 +4490,6 @@
               <a:rPr lang="es-ES" sz="900" dirty="0" smtClean="0"/>
               <a:t>hidroeléctrica</a:t>
             </a:r>
-            <a:endParaRPr lang="es-ES" sz="900" dirty="0" smtClean="0"/>
           </a:p>
           <a:p>
             <a:pPr marL="171450" indent="-171450">
@@ -4519,7 +4500,6 @@
               <a:rPr lang="es-ES" sz="900" dirty="0" smtClean="0"/>
               <a:t>solar</a:t>
             </a:r>
-            <a:endParaRPr lang="es-ES" sz="900" dirty="0" smtClean="0"/>
           </a:p>
           <a:p>
             <a:pPr marL="171450" indent="-171450">
@@ -4530,7 +4510,6 @@
               <a:rPr lang="es-ES" sz="900" dirty="0" smtClean="0"/>
               <a:t>mareomotriz</a:t>
             </a:r>
-            <a:endParaRPr lang="es-ES" sz="900" dirty="0" smtClean="0"/>
           </a:p>
           <a:p>
             <a:pPr marL="171450" indent="-171450">
@@ -4551,7 +4530,6 @@
               <a:rPr lang="es-ES" sz="900" dirty="0" smtClean="0"/>
               <a:t>eólica</a:t>
             </a:r>
-            <a:endParaRPr lang="es-ES" sz="900" dirty="0" smtClean="0"/>
           </a:p>
         </p:txBody>
       </p:sp>
@@ -4594,7 +4572,6 @@
               <a:rPr lang="es-ES" sz="900" dirty="0" smtClean="0"/>
               <a:t>fósil</a:t>
             </a:r>
-            <a:endParaRPr lang="es-ES" sz="900" dirty="0" smtClean="0"/>
           </a:p>
           <a:p>
             <a:pPr marL="171450" indent="-171450" algn="just">
@@ -4605,7 +4582,6 @@
               <a:rPr lang="es-ES" sz="900" dirty="0" smtClean="0"/>
               <a:t>carbón</a:t>
             </a:r>
-            <a:endParaRPr lang="es-ES" sz="900" dirty="0" smtClean="0"/>
           </a:p>
           <a:p>
             <a:pPr marL="171450" indent="-171450" algn="just">
@@ -4616,7 +4592,6 @@
               <a:rPr lang="es-ES" sz="900" dirty="0" smtClean="0"/>
               <a:t>petróleo</a:t>
             </a:r>
-            <a:endParaRPr lang="es-ES" sz="900" dirty="0" smtClean="0"/>
           </a:p>
           <a:p>
             <a:pPr marL="171450" indent="-171450" algn="just">
@@ -4625,11 +4600,7 @@
             </a:pPr>
             <a:r>
               <a:rPr lang="es-ES" sz="900" dirty="0" smtClean="0"/>
-              <a:t>gas </a:t>
-            </a:r>
-            <a:r>
-              <a:rPr lang="es-ES" sz="900" dirty="0" smtClean="0"/>
-              <a:t>natural</a:t>
+              <a:t>gas natural</a:t>
             </a:r>
           </a:p>
           <a:p>
@@ -4641,7 +4612,6 @@
               <a:rPr lang="es-ES" sz="900" dirty="0" smtClean="0"/>
               <a:t>nuclear</a:t>
             </a:r>
-            <a:endParaRPr lang="es-ES" sz="900" dirty="0" smtClean="0"/>
           </a:p>
         </p:txBody>
       </p:sp>
@@ -4717,7 +4687,6 @@
               <a:rPr lang="es-ES" sz="1000" dirty="0" smtClean="0"/>
               <a:t>P = W/t</a:t>
             </a:r>
-            <a:endParaRPr lang="es-ES" sz="1000" dirty="0" smtClean="0"/>
           </a:p>
         </p:txBody>
       </p:sp>
@@ -4829,7 +4798,6 @@
               <a:rPr lang="es-ES" sz="900" dirty="0" smtClean="0"/>
               <a:t>nergía</a:t>
             </a:r>
-            <a:endParaRPr lang="es-ES" sz="900" dirty="0" smtClean="0"/>
           </a:p>
           <a:p>
             <a:pPr algn="ctr"/>
@@ -4876,7 +4844,6 @@
               <a:rPr lang="es-ES" sz="900" dirty="0" smtClean="0"/>
               <a:t>nergía</a:t>
             </a:r>
-            <a:endParaRPr lang="es-ES" sz="900" dirty="0" smtClean="0"/>
           </a:p>
           <a:p>
             <a:pPr algn="ctr"/>
@@ -4921,11 +4888,7 @@
             </a:r>
             <a:r>
               <a:rPr lang="es-ES" sz="900" dirty="0" smtClean="0"/>
-              <a:t>nergía </a:t>
-            </a:r>
-            <a:r>
-              <a:rPr lang="es-ES" sz="900" dirty="0" smtClean="0"/>
-              <a:t>potencial elástica</a:t>
+              <a:t>nergía potencial elástica</a:t>
             </a:r>
           </a:p>
         </p:txBody>
@@ -4960,11 +4923,7 @@
             <a:pPr algn="ctr"/>
             <a:r>
               <a:rPr lang="es-ES" sz="900" dirty="0" smtClean="0"/>
-              <a:t>la </a:t>
-            </a:r>
-            <a:r>
-              <a:rPr lang="es-ES" sz="900" dirty="0" smtClean="0"/>
-              <a:t>masa y la velocidad</a:t>
+              <a:t>la masa y la velocidad</a:t>
             </a:r>
           </a:p>
         </p:txBody>
@@ -5011,11 +4970,7 @@
             </a:r>
             <a:r>
               <a:rPr lang="es-ES" sz="900" dirty="0" smtClean="0"/>
-              <a:t>a </a:t>
-            </a:r>
-            <a:r>
-              <a:rPr lang="es-ES" sz="900" dirty="0" smtClean="0"/>
-              <a:t>altura y la gravedad</a:t>
+              <a:t>a altura y la gravedad</a:t>
             </a:r>
           </a:p>
         </p:txBody>
@@ -5050,15 +5005,7 @@
             <a:pPr algn="ctr"/>
             <a:r>
               <a:rPr lang="es-ES" sz="900" dirty="0" smtClean="0"/>
-              <a:t>cu</a:t>
-            </a:r>
-            <a:r>
-              <a:rPr lang="es-ES" sz="900" dirty="0" smtClean="0"/>
-              <a:t>erpos </a:t>
-            </a:r>
-            <a:r>
-              <a:rPr lang="es-ES" sz="900" dirty="0" smtClean="0"/>
-              <a:t>elásticos y deformables</a:t>
+              <a:t>cuerpos elásticos y deformables</a:t>
             </a:r>
           </a:p>
         </p:txBody>
@@ -5132,11 +5079,7 @@
             <a:pPr algn="ctr"/>
             <a:r>
               <a:rPr lang="es-ES" sz="900" dirty="0" smtClean="0"/>
-              <a:t>Watts (W</a:t>
-            </a:r>
-            <a:r>
-              <a:rPr lang="es-ES" sz="900" dirty="0" smtClean="0"/>
-              <a:t>)</a:t>
+              <a:t>Watts (W)</a:t>
             </a:r>
           </a:p>
           <a:p>
@@ -5149,7 +5092,6 @@
               <a:rPr lang="es-ES" sz="900" baseline="30000" dirty="0" smtClean="0"/>
               <a:t>-1</a:t>
             </a:r>
-            <a:endParaRPr lang="es-ES" sz="900" baseline="30000" dirty="0" smtClean="0"/>
           </a:p>
         </p:txBody>
       </p:sp>
@@ -7367,15 +7309,7 @@
                   <a:schemeClr val="tx1"/>
                 </a:solidFill>
               </a:rPr>
-              <a:t>se </a:t>
-            </a:r>
-            <a:r>
-              <a:rPr lang="es-ES" sz="900" dirty="0" smtClean="0">
-                <a:solidFill>
-                  <a:schemeClr val="tx1"/>
-                </a:solidFill>
-              </a:rPr>
-              <a:t>obtiene de</a:t>
+              <a:t>se obtiene de</a:t>
             </a:r>
             <a:endParaRPr lang="es-ES" sz="900" dirty="0">
               <a:solidFill>

</xml_diff>